<commit_message>
Updated ppt with equation
</commit_message>
<xml_diff>
--- a/Hackathon2023-AI-Chauffeurs.pptx
+++ b/Hackathon2023-AI-Chauffeurs.pptx
@@ -8,9 +8,10 @@
     <p:sldId id="256" r:id="rId5"/>
     <p:sldId id="268" r:id="rId6"/>
     <p:sldId id="269" r:id="rId7"/>
-    <p:sldId id="272" r:id="rId8"/>
-    <p:sldId id="270" r:id="rId9"/>
-    <p:sldId id="271" r:id="rId10"/>
+    <p:sldId id="273" r:id="rId8"/>
+    <p:sldId id="272" r:id="rId9"/>
+    <p:sldId id="270" r:id="rId10"/>
+    <p:sldId id="271" r:id="rId11"/>
   </p:sldIdLst>
   <p:sldSz cx="12192000" cy="6858000"/>
   <p:notesSz cx="6858000" cy="9144000"/>
@@ -266,7 +267,7 @@
           <a:p>
             <a:fld id="{7DF287A2-7AA5-144D-BE83-1052F0A3DB6E}" type="datetimeFigureOut">
               <a:rPr lang="en-US" smtClean="0"/>
-              <a:t>8/29/2023</a:t>
+              <a:t>9/15/2023</a:t>
             </a:fld>
             <a:endParaRPr lang="en-US" dirty="0"/>
           </a:p>
@@ -466,7 +467,7 @@
           <a:p>
             <a:fld id="{7DF287A2-7AA5-144D-BE83-1052F0A3DB6E}" type="datetimeFigureOut">
               <a:rPr lang="en-US" smtClean="0"/>
-              <a:t>8/29/2023</a:t>
+              <a:t>9/15/2023</a:t>
             </a:fld>
             <a:endParaRPr lang="en-US" dirty="0"/>
           </a:p>
@@ -676,7 +677,7 @@
           <a:p>
             <a:fld id="{7DF287A2-7AA5-144D-BE83-1052F0A3DB6E}" type="datetimeFigureOut">
               <a:rPr lang="en-US" smtClean="0"/>
-              <a:t>8/29/2023</a:t>
+              <a:t>9/15/2023</a:t>
             </a:fld>
             <a:endParaRPr lang="en-US" dirty="0"/>
           </a:p>
@@ -876,7 +877,7 @@
           <a:p>
             <a:fld id="{7DF287A2-7AA5-144D-BE83-1052F0A3DB6E}" type="datetimeFigureOut">
               <a:rPr lang="en-US" smtClean="0"/>
-              <a:t>8/29/2023</a:t>
+              <a:t>9/15/2023</a:t>
             </a:fld>
             <a:endParaRPr lang="en-US" dirty="0"/>
           </a:p>
@@ -1152,7 +1153,7 @@
           <a:p>
             <a:fld id="{7DF287A2-7AA5-144D-BE83-1052F0A3DB6E}" type="datetimeFigureOut">
               <a:rPr lang="en-US" smtClean="0"/>
-              <a:t>8/29/2023</a:t>
+              <a:t>9/15/2023</a:t>
             </a:fld>
             <a:endParaRPr lang="en-US" dirty="0"/>
           </a:p>
@@ -1420,7 +1421,7 @@
           <a:p>
             <a:fld id="{7DF287A2-7AA5-144D-BE83-1052F0A3DB6E}" type="datetimeFigureOut">
               <a:rPr lang="en-US" smtClean="0"/>
-              <a:t>8/29/2023</a:t>
+              <a:t>9/15/2023</a:t>
             </a:fld>
             <a:endParaRPr lang="en-US" dirty="0"/>
           </a:p>
@@ -1835,7 +1836,7 @@
           <a:p>
             <a:fld id="{7DF287A2-7AA5-144D-BE83-1052F0A3DB6E}" type="datetimeFigureOut">
               <a:rPr lang="en-US" smtClean="0"/>
-              <a:t>8/29/2023</a:t>
+              <a:t>9/15/2023</a:t>
             </a:fld>
             <a:endParaRPr lang="en-US" dirty="0"/>
           </a:p>
@@ -1977,7 +1978,7 @@
           <a:p>
             <a:fld id="{7DF287A2-7AA5-144D-BE83-1052F0A3DB6E}" type="datetimeFigureOut">
               <a:rPr lang="en-US" smtClean="0"/>
-              <a:t>8/29/2023</a:t>
+              <a:t>9/15/2023</a:t>
             </a:fld>
             <a:endParaRPr lang="en-US" dirty="0"/>
           </a:p>
@@ -2090,7 +2091,7 @@
           <a:p>
             <a:fld id="{7DF287A2-7AA5-144D-BE83-1052F0A3DB6E}" type="datetimeFigureOut">
               <a:rPr lang="en-US" smtClean="0"/>
-              <a:t>8/29/2023</a:t>
+              <a:t>9/15/2023</a:t>
             </a:fld>
             <a:endParaRPr lang="en-US" dirty="0"/>
           </a:p>
@@ -2403,7 +2404,7 @@
           <a:p>
             <a:fld id="{7DF287A2-7AA5-144D-BE83-1052F0A3DB6E}" type="datetimeFigureOut">
               <a:rPr lang="en-US" smtClean="0"/>
-              <a:t>8/29/2023</a:t>
+              <a:t>9/15/2023</a:t>
             </a:fld>
             <a:endParaRPr lang="en-US" dirty="0"/>
           </a:p>
@@ -2692,7 +2693,7 @@
           <a:p>
             <a:fld id="{7DF287A2-7AA5-144D-BE83-1052F0A3DB6E}" type="datetimeFigureOut">
               <a:rPr lang="en-US" smtClean="0"/>
-              <a:t>8/29/2023</a:t>
+              <a:t>9/15/2023</a:t>
             </a:fld>
             <a:endParaRPr lang="en-US" dirty="0"/>
           </a:p>
@@ -2935,7 +2936,7 @@
           <a:p>
             <a:fld id="{7DF287A2-7AA5-144D-BE83-1052F0A3DB6E}" type="datetimeFigureOut">
               <a:rPr lang="en-US" smtClean="0"/>
-              <a:t>8/29/2023</a:t>
+              <a:t>9/15/2023</a:t>
             </a:fld>
             <a:endParaRPr lang="en-US" dirty="0"/>
           </a:p>
@@ -4786,8 +4787,37 @@
           <a:bodyPr rtlCol="0" anchor="ctr"/>
           <a:lstStyle/>
           <a:p>
-            <a:pPr algn="ctr"/>
-            <a:endParaRPr lang="en-US" dirty="0"/>
+            <a:pPr marL="0" marR="0" lvl="0" indent="0" algn="ctr" defTabSz="914400" rtl="0" eaLnBrk="1" fontAlgn="auto" latinLnBrk="0" hangingPunct="1">
+              <a:lnSpc>
+                <a:spcPct val="100000"/>
+              </a:lnSpc>
+              <a:spcBef>
+                <a:spcPts val="0"/>
+              </a:spcBef>
+              <a:spcAft>
+                <a:spcPts val="0"/>
+              </a:spcAft>
+              <a:buClrTx/>
+              <a:buSzTx/>
+              <a:buFontTx/>
+              <a:buNone/>
+              <a:tabLst/>
+              <a:defRPr/>
+            </a:pPr>
+            <a:endParaRPr kumimoji="0" lang="en-US" sz="1800" b="0" i="0" u="none" strike="noStrike" kern="1200" cap="none" spc="0" normalizeH="0" baseline="0" noProof="0" dirty="0">
+              <a:ln>
+                <a:noFill/>
+              </a:ln>
+              <a:solidFill>
+                <a:prstClr val="white"/>
+              </a:solidFill>
+              <a:effectLst/>
+              <a:uLnTx/>
+              <a:uFillTx/>
+              <a:latin typeface="Calibri" panose="020F0502020204030204"/>
+              <a:ea typeface="+mn-ea"/>
+              <a:cs typeface="+mn-cs"/>
+            </a:endParaRPr>
           </a:p>
         </p:txBody>
       </p:sp>
@@ -4861,8 +4891,37 @@
           <a:bodyPr rtlCol="0" anchor="ctr"/>
           <a:lstStyle/>
           <a:p>
-            <a:pPr algn="ctr"/>
-            <a:endParaRPr lang="en-US" dirty="0"/>
+            <a:pPr marL="0" marR="0" lvl="0" indent="0" algn="ctr" defTabSz="914400" rtl="0" eaLnBrk="1" fontAlgn="auto" latinLnBrk="0" hangingPunct="1">
+              <a:lnSpc>
+                <a:spcPct val="100000"/>
+              </a:lnSpc>
+              <a:spcBef>
+                <a:spcPts val="0"/>
+              </a:spcBef>
+              <a:spcAft>
+                <a:spcPts val="0"/>
+              </a:spcAft>
+              <a:buClrTx/>
+              <a:buSzTx/>
+              <a:buFontTx/>
+              <a:buNone/>
+              <a:tabLst/>
+              <a:defRPr/>
+            </a:pPr>
+            <a:endParaRPr kumimoji="0" lang="en-US" sz="1800" b="0" i="0" u="none" strike="noStrike" kern="1200" cap="none" spc="0" normalizeH="0" baseline="0" noProof="0" dirty="0">
+              <a:ln>
+                <a:noFill/>
+              </a:ln>
+              <a:solidFill>
+                <a:prstClr val="white"/>
+              </a:solidFill>
+              <a:effectLst/>
+              <a:uLnTx/>
+              <a:uFillTx/>
+              <a:latin typeface="Calibri" panose="020F0502020204030204"/>
+              <a:ea typeface="+mn-ea"/>
+              <a:cs typeface="+mn-cs"/>
+            </a:endParaRPr>
           </a:p>
         </p:txBody>
       </p:sp>
@@ -4937,8 +4996,37 @@
           <a:bodyPr rtlCol="0" anchor="ctr"/>
           <a:lstStyle/>
           <a:p>
-            <a:pPr algn="ctr"/>
-            <a:endParaRPr lang="en-US" dirty="0"/>
+            <a:pPr marL="0" marR="0" lvl="0" indent="0" algn="ctr" defTabSz="914400" rtl="0" eaLnBrk="1" fontAlgn="auto" latinLnBrk="0" hangingPunct="1">
+              <a:lnSpc>
+                <a:spcPct val="100000"/>
+              </a:lnSpc>
+              <a:spcBef>
+                <a:spcPts val="0"/>
+              </a:spcBef>
+              <a:spcAft>
+                <a:spcPts val="0"/>
+              </a:spcAft>
+              <a:buClrTx/>
+              <a:buSzTx/>
+              <a:buFontTx/>
+              <a:buNone/>
+              <a:tabLst/>
+              <a:defRPr/>
+            </a:pPr>
+            <a:endParaRPr kumimoji="0" lang="en-US" sz="1800" b="0" i="0" u="none" strike="noStrike" kern="1200" cap="none" spc="0" normalizeH="0" baseline="0" noProof="0" dirty="0">
+              <a:ln>
+                <a:noFill/>
+              </a:ln>
+              <a:solidFill>
+                <a:prstClr val="white"/>
+              </a:solidFill>
+              <a:effectLst/>
+              <a:uLnTx/>
+              <a:uFillTx/>
+              <a:latin typeface="Calibri" panose="020F0502020204030204"/>
+              <a:ea typeface="+mn-ea"/>
+              <a:cs typeface="+mn-cs"/>
+            </a:endParaRPr>
           </a:p>
         </p:txBody>
       </p:sp>
@@ -5012,8 +5100,37 @@
           <a:bodyPr rtlCol="0" anchor="ctr"/>
           <a:lstStyle/>
           <a:p>
-            <a:pPr algn="ctr"/>
-            <a:endParaRPr lang="en-US" dirty="0"/>
+            <a:pPr marL="0" marR="0" lvl="0" indent="0" algn="ctr" defTabSz="914400" rtl="0" eaLnBrk="1" fontAlgn="auto" latinLnBrk="0" hangingPunct="1">
+              <a:lnSpc>
+                <a:spcPct val="100000"/>
+              </a:lnSpc>
+              <a:spcBef>
+                <a:spcPts val="0"/>
+              </a:spcBef>
+              <a:spcAft>
+                <a:spcPts val="0"/>
+              </a:spcAft>
+              <a:buClrTx/>
+              <a:buSzTx/>
+              <a:buFontTx/>
+              <a:buNone/>
+              <a:tabLst/>
+              <a:defRPr/>
+            </a:pPr>
+            <a:endParaRPr kumimoji="0" lang="en-US" sz="1800" b="0" i="0" u="none" strike="noStrike" kern="1200" cap="none" spc="0" normalizeH="0" baseline="0" noProof="0" dirty="0">
+              <a:ln>
+                <a:noFill/>
+              </a:ln>
+              <a:solidFill>
+                <a:prstClr val="white"/>
+              </a:solidFill>
+              <a:effectLst/>
+              <a:uLnTx/>
+              <a:uFillTx/>
+              <a:latin typeface="Calibri" panose="020F0502020204030204"/>
+              <a:ea typeface="+mn-ea"/>
+              <a:cs typeface="+mn-cs"/>
+            </a:endParaRPr>
           </a:p>
         </p:txBody>
       </p:sp>
@@ -5064,162 +5181,91 @@
             </a:lvl1pPr>
           </a:lstStyle>
           <a:p>
-            <a:r>
-              <a:rPr lang="en-IN" sz="4000" dirty="0">
+            <a:pPr marL="0" marR="0" lvl="0" indent="0" algn="l" defTabSz="914400" rtl="0" eaLnBrk="1" fontAlgn="auto" latinLnBrk="0" hangingPunct="1">
+              <a:lnSpc>
+                <a:spcPct val="90000"/>
+              </a:lnSpc>
+              <a:spcBef>
+                <a:spcPct val="0"/>
+              </a:spcBef>
+              <a:spcAft>
+                <a:spcPts val="0"/>
+              </a:spcAft>
+              <a:buClrTx/>
+              <a:buSzTx/>
+              <a:buFontTx/>
+              <a:buNone/>
+              <a:tabLst/>
+              <a:defRPr/>
+            </a:pPr>
+            <a:r>
+              <a:rPr kumimoji="0" lang="en-IN" sz="4000" b="0" i="0" u="none" strike="noStrike" kern="1200" cap="none" spc="0" normalizeH="0" baseline="0" noProof="0" dirty="0">
+                <a:ln>
+                  <a:noFill/>
+                </a:ln>
                 <a:solidFill>
                   <a:srgbClr val="FFFFFF"/>
                 </a:solidFill>
+                <a:effectLst/>
+                <a:uLnTx/>
+                <a:uFillTx/>
+                <a:latin typeface="Calibri Light" panose="020F0302020204030204"/>
+                <a:ea typeface="+mj-ea"/>
+                <a:cs typeface="+mj-cs"/>
               </a:rPr>
-              <a:t>Demo</a:t>
-            </a:r>
-            <a:endParaRPr lang="en-US" dirty="0"/>
-          </a:p>
-        </p:txBody>
-      </p:sp>
-      <p:sp>
-        <p:nvSpPr>
-          <p:cNvPr id="2" name="TextBox 1">
-            <a:extLst>
-              <a:ext uri="{FF2B5EF4-FFF2-40B4-BE49-F238E27FC236}">
-                <a16:creationId xmlns:a16="http://schemas.microsoft.com/office/drawing/2014/main" id="{0CB64A6C-1302-48EF-F365-F1BD12C9B9F1}"/>
-              </a:ext>
-            </a:extLst>
-          </p:cNvPr>
-          <p:cNvSpPr txBox="1"/>
+              <a:t>Idea</a:t>
+            </a:r>
+            <a:endParaRPr kumimoji="0" lang="en-US" sz="4400" b="0" i="0" u="none" strike="noStrike" kern="1200" cap="none" spc="0" normalizeH="0" baseline="0" noProof="0" dirty="0">
+              <a:ln>
+                <a:noFill/>
+              </a:ln>
+              <a:solidFill>
+                <a:prstClr val="black"/>
+              </a:solidFill>
+              <a:effectLst/>
+              <a:uLnTx/>
+              <a:uFillTx/>
+              <a:latin typeface="Calibri Light" panose="020F0302020204030204"/>
+              <a:ea typeface="+mj-ea"/>
+              <a:cs typeface="+mj-cs"/>
+            </a:endParaRPr>
+          </a:p>
+        </p:txBody>
+      </p:sp>
+      <p:pic>
+        <p:nvPicPr>
+          <p:cNvPr id="6" name="Picture 5" descr="A close-up of a math problem&#10;&#10;Description automatically generated">
+            <a:extLst>
+              <a:ext uri="{FF2B5EF4-FFF2-40B4-BE49-F238E27FC236}">
+                <a16:creationId xmlns:a16="http://schemas.microsoft.com/office/drawing/2014/main" id="{60CBF424-EFD3-456D-AFF3-DD0D53A348E1}"/>
+              </a:ext>
+            </a:extLst>
+          </p:cNvPr>
+          <p:cNvPicPr>
+            <a:picLocks noChangeAspect="1"/>
+          </p:cNvPicPr>
           <p:nvPr/>
-        </p:nvSpPr>
+        </p:nvPicPr>
+        <p:blipFill>
+          <a:blip r:embed="rId2"/>
+          <a:stretch>
+            <a:fillRect/>
+          </a:stretch>
+        </p:blipFill>
         <p:spPr>
           <a:xfrm>
-            <a:off x="441434" y="1962740"/>
-            <a:ext cx="9625204" cy="4247317"/>
+            <a:off x="2619282" y="1723037"/>
+            <a:ext cx="7144632" cy="4987389"/>
           </a:xfrm>
           <a:prstGeom prst="rect">
             <a:avLst/>
           </a:prstGeom>
-          <a:noFill/>
         </p:spPr>
-        <p:txBody>
-          <a:bodyPr wrap="square" rtlCol="0">
-            <a:spAutoFit/>
-          </a:bodyPr>
-          <a:lstStyle/>
-          <a:p>
-            <a:r>
-              <a:rPr lang="en-US" b="1" dirty="0"/>
-              <a:t>Features considered in the proposed solution:</a:t>
-            </a:r>
-          </a:p>
-          <a:p>
-            <a:endParaRPr lang="en-US" b="1" dirty="0"/>
-          </a:p>
-          <a:p>
-            <a:pPr marL="285750" indent="-285750">
-              <a:buFontTx/>
-              <a:buChar char="-"/>
-            </a:pPr>
-            <a:r>
-              <a:rPr lang="en-US" dirty="0"/>
-              <a:t>Store Id ( This would be beneficial to identify the kitchen capacity)</a:t>
-            </a:r>
-          </a:p>
-          <a:p>
-            <a:pPr marL="285750" indent="-285750">
-              <a:buFontTx/>
-              <a:buChar char="-"/>
-            </a:pPr>
-            <a:r>
-              <a:rPr lang="en-US" dirty="0"/>
-              <a:t>Order day and time</a:t>
-            </a:r>
-          </a:p>
-          <a:p>
-            <a:pPr marL="285750" indent="-285750">
-              <a:buFontTx/>
-              <a:buChar char="-"/>
-            </a:pPr>
-            <a:r>
-              <a:rPr lang="en-US" dirty="0"/>
-              <a:t>Order size (in terms of amount)</a:t>
-            </a:r>
-          </a:p>
-          <a:p>
-            <a:pPr marL="285750" indent="-285750">
-              <a:buFontTx/>
-              <a:buChar char="-"/>
-            </a:pPr>
-            <a:r>
-              <a:rPr lang="en-US" dirty="0"/>
-              <a:t>Order size (in terms of # of items ordered)</a:t>
-            </a:r>
-          </a:p>
-          <a:p>
-            <a:pPr marL="285750" indent="-285750">
-              <a:buFontTx/>
-              <a:buChar char="-"/>
-            </a:pPr>
-            <a:r>
-              <a:rPr lang="en-US" dirty="0"/>
-              <a:t>Pending Orders count in kitchen (at time when current order is placed)</a:t>
-            </a:r>
-          </a:p>
-          <a:p>
-            <a:pPr marL="285750" indent="-285750">
-              <a:buFontTx/>
-              <a:buChar char="-"/>
-            </a:pPr>
-            <a:r>
-              <a:rPr lang="en-US" dirty="0"/>
-              <a:t>Pending Orders size (in terms of amount)</a:t>
-            </a:r>
-          </a:p>
-          <a:p>
-            <a:pPr marL="285750" indent="-285750">
-              <a:buFontTx/>
-              <a:buChar char="-"/>
-            </a:pPr>
-            <a:r>
-              <a:rPr lang="en-US" dirty="0"/>
-              <a:t>Pending Orders size (in terms of # of items ordered)</a:t>
-            </a:r>
-          </a:p>
-          <a:p>
-            <a:pPr marL="285750" indent="-285750">
-              <a:buFontTx/>
-              <a:buChar char="-"/>
-            </a:pPr>
-            <a:r>
-              <a:rPr lang="en-US" dirty="0"/>
-              <a:t>Order preparation time</a:t>
-            </a:r>
-          </a:p>
-          <a:p>
-            <a:pPr marL="285750" indent="-285750">
-              <a:buFontTx/>
-              <a:buChar char="-"/>
-            </a:pPr>
-            <a:endParaRPr lang="en-US" b="1" dirty="0"/>
-          </a:p>
-          <a:p>
-            <a:endParaRPr lang="en-US" dirty="0"/>
-          </a:p>
-          <a:p>
-            <a:r>
-              <a:rPr lang="en-US" b="1" dirty="0"/>
-              <a:t>Demo: to follow</a:t>
-            </a:r>
-          </a:p>
-          <a:p>
-            <a:endParaRPr lang="en-US" dirty="0"/>
-          </a:p>
-          <a:p>
-            <a:endParaRPr lang="en-US" dirty="0"/>
-          </a:p>
-        </p:txBody>
-      </p:sp>
+      </p:pic>
     </p:spTree>
     <p:extLst>
       <p:ext uri="{BB962C8B-B14F-4D97-AF65-F5344CB8AC3E}">
-        <p14:creationId xmlns:p14="http://schemas.microsoft.com/office/powerpoint/2010/main" val="3775572590"/>
+        <p14:creationId xmlns:p14="http://schemas.microsoft.com/office/powerpoint/2010/main" val="169135408"/>
       </p:ext>
     </p:extLst>
   </p:cSld>
@@ -5609,6 +5655,545 @@
                   <a:srgbClr val="FFFFFF"/>
                 </a:solidFill>
               </a:rPr>
+              <a:t>Demo</a:t>
+            </a:r>
+            <a:endParaRPr lang="en-US" dirty="0"/>
+          </a:p>
+        </p:txBody>
+      </p:sp>
+      <p:sp>
+        <p:nvSpPr>
+          <p:cNvPr id="2" name="TextBox 1">
+            <a:extLst>
+              <a:ext uri="{FF2B5EF4-FFF2-40B4-BE49-F238E27FC236}">
+                <a16:creationId xmlns:a16="http://schemas.microsoft.com/office/drawing/2014/main" id="{0CB64A6C-1302-48EF-F365-F1BD12C9B9F1}"/>
+              </a:ext>
+            </a:extLst>
+          </p:cNvPr>
+          <p:cNvSpPr txBox="1"/>
+          <p:nvPr/>
+        </p:nvSpPr>
+        <p:spPr>
+          <a:xfrm>
+            <a:off x="441434" y="1962740"/>
+            <a:ext cx="9625204" cy="4247317"/>
+          </a:xfrm>
+          <a:prstGeom prst="rect">
+            <a:avLst/>
+          </a:prstGeom>
+          <a:noFill/>
+        </p:spPr>
+        <p:txBody>
+          <a:bodyPr wrap="square" rtlCol="0">
+            <a:spAutoFit/>
+          </a:bodyPr>
+          <a:lstStyle/>
+          <a:p>
+            <a:r>
+              <a:rPr lang="en-US" b="1" dirty="0"/>
+              <a:t>Features considered in the proposed solution:</a:t>
+            </a:r>
+          </a:p>
+          <a:p>
+            <a:endParaRPr lang="en-US" b="1" dirty="0"/>
+          </a:p>
+          <a:p>
+            <a:pPr marL="285750" indent="-285750">
+              <a:buFontTx/>
+              <a:buChar char="-"/>
+            </a:pPr>
+            <a:r>
+              <a:rPr lang="en-US" dirty="0"/>
+              <a:t>Store Id ( This would be beneficial to identify the kitchen capacity)</a:t>
+            </a:r>
+          </a:p>
+          <a:p>
+            <a:pPr marL="285750" indent="-285750">
+              <a:buFontTx/>
+              <a:buChar char="-"/>
+            </a:pPr>
+            <a:r>
+              <a:rPr lang="en-US" dirty="0"/>
+              <a:t>Order day and time</a:t>
+            </a:r>
+          </a:p>
+          <a:p>
+            <a:pPr marL="285750" indent="-285750">
+              <a:buFontTx/>
+              <a:buChar char="-"/>
+            </a:pPr>
+            <a:r>
+              <a:rPr lang="en-US" dirty="0"/>
+              <a:t>Order size (in terms of amount)</a:t>
+            </a:r>
+          </a:p>
+          <a:p>
+            <a:pPr marL="285750" indent="-285750">
+              <a:buFontTx/>
+              <a:buChar char="-"/>
+            </a:pPr>
+            <a:r>
+              <a:rPr lang="en-US" dirty="0"/>
+              <a:t>Order size (in terms of # of items ordered)</a:t>
+            </a:r>
+          </a:p>
+          <a:p>
+            <a:pPr marL="285750" indent="-285750">
+              <a:buFontTx/>
+              <a:buChar char="-"/>
+            </a:pPr>
+            <a:r>
+              <a:rPr lang="en-US" dirty="0"/>
+              <a:t>Pending Orders count in kitchen (at time when current order is placed)</a:t>
+            </a:r>
+          </a:p>
+          <a:p>
+            <a:pPr marL="285750" indent="-285750">
+              <a:buFontTx/>
+              <a:buChar char="-"/>
+            </a:pPr>
+            <a:r>
+              <a:rPr lang="en-US" dirty="0"/>
+              <a:t>Pending Orders size (in terms of amount)</a:t>
+            </a:r>
+          </a:p>
+          <a:p>
+            <a:pPr marL="285750" indent="-285750">
+              <a:buFontTx/>
+              <a:buChar char="-"/>
+            </a:pPr>
+            <a:r>
+              <a:rPr lang="en-US" dirty="0"/>
+              <a:t>Pending Orders size (in terms of # of items ordered)</a:t>
+            </a:r>
+          </a:p>
+          <a:p>
+            <a:pPr marL="285750" indent="-285750">
+              <a:buFontTx/>
+              <a:buChar char="-"/>
+            </a:pPr>
+            <a:r>
+              <a:rPr lang="en-US" dirty="0"/>
+              <a:t>Order preparation time</a:t>
+            </a:r>
+          </a:p>
+          <a:p>
+            <a:pPr marL="285750" indent="-285750">
+              <a:buFontTx/>
+              <a:buChar char="-"/>
+            </a:pPr>
+            <a:endParaRPr lang="en-US" b="1" dirty="0"/>
+          </a:p>
+          <a:p>
+            <a:endParaRPr lang="en-US" dirty="0"/>
+          </a:p>
+          <a:p>
+            <a:r>
+              <a:rPr lang="en-US" b="1" dirty="0"/>
+              <a:t>Demo: to follow</a:t>
+            </a:r>
+          </a:p>
+          <a:p>
+            <a:endParaRPr lang="en-US" dirty="0"/>
+          </a:p>
+          <a:p>
+            <a:endParaRPr lang="en-US" dirty="0"/>
+          </a:p>
+        </p:txBody>
+      </p:sp>
+    </p:spTree>
+    <p:extLst>
+      <p:ext uri="{BB962C8B-B14F-4D97-AF65-F5344CB8AC3E}">
+        <p14:creationId xmlns:p14="http://schemas.microsoft.com/office/powerpoint/2010/main" val="3775572590"/>
+      </p:ext>
+    </p:extLst>
+  </p:cSld>
+  <p:clrMapOvr>
+    <a:masterClrMapping/>
+  </p:clrMapOvr>
+</p:sld>
+</file>
+
+<file path=ppt/slides/slide6.xml><?xml version="1.0" encoding="utf-8"?>
+<p:sld xmlns:a="http://schemas.openxmlformats.org/drawingml/2006/main" xmlns:r="http://schemas.openxmlformats.org/officeDocument/2006/relationships" xmlns:p="http://schemas.openxmlformats.org/presentationml/2006/main">
+  <p:cSld>
+    <p:bg>
+      <p:bgPr>
+        <a:solidFill>
+          <a:schemeClr val="bg1"/>
+        </a:solidFill>
+        <a:effectLst/>
+      </p:bgPr>
+    </p:bg>
+    <p:spTree>
+      <p:nvGrpSpPr>
+        <p:cNvPr id="1" name=""/>
+        <p:cNvGrpSpPr/>
+        <p:nvPr/>
+      </p:nvGrpSpPr>
+      <p:grpSpPr>
+        <a:xfrm>
+          <a:off x="0" y="0"/>
+          <a:ext cx="0" cy="0"/>
+          <a:chOff x="0" y="0"/>
+          <a:chExt cx="0" cy="0"/>
+        </a:xfrm>
+      </p:grpSpPr>
+      <p:sp useBgFill="1">
+        <p:nvSpPr>
+          <p:cNvPr id="22" name="Rectangle 21">
+            <a:extLst>
+              <a:ext uri="{FF2B5EF4-FFF2-40B4-BE49-F238E27FC236}">
+                <a16:creationId xmlns:a16="http://schemas.microsoft.com/office/drawing/2014/main" id="{BACC6370-2D7E-4714-9D71-7542949D7D5D}"/>
+              </a:ext>
+              <a:ext uri="{C183D7F6-B498-43B3-948B-1728B52AA6E4}">
+                <adec:decorative xmlns:adec="http://schemas.microsoft.com/office/drawing/2017/decorative" val="1"/>
+              </a:ext>
+            </a:extLst>
+          </p:cNvPr>
+          <p:cNvSpPr>
+            <a:spLocks noGrp="1" noRot="1" noChangeAspect="1" noMove="1" noResize="1" noEditPoints="1" noAdjustHandles="1" noChangeArrowheads="1" noChangeShapeType="1" noTextEdit="1"/>
+          </p:cNvSpPr>
+          <p:nvPr>
+            <p:extLst>
+              <p:ext uri="{386F3935-93C4-4BCD-93E2-E3B085C9AB24}">
+                <p16:designElem xmlns:p16="http://schemas.microsoft.com/office/powerpoint/2015/main" val="1"/>
+              </p:ext>
+            </p:extLst>
+          </p:nvPr>
+        </p:nvSpPr>
+        <p:spPr>
+          <a:xfrm>
+            <a:off x="0" y="0"/>
+            <a:ext cx="12192000" cy="6858000"/>
+          </a:xfrm>
+          <a:prstGeom prst="rect">
+            <a:avLst/>
+          </a:prstGeom>
+          <a:ln w="12700" cap="flat" cmpd="sng" algn="ctr">
+            <a:noFill/>
+            <a:prstDash val="solid"/>
+            <a:miter lim="800000"/>
+          </a:ln>
+          <a:effectLst/>
+          <a:extLst>
+            <a:ext uri="{91240B29-F687-4F45-9708-019B960494DF}">
+              <a14:hiddenLine xmlns:a14="http://schemas.microsoft.com/office/drawing/2010/main" w="12700" cap="flat" cmpd="sng" algn="ctr">
+                <a:solidFill>
+                  <a:schemeClr val="accent1">
+                    <a:shade val="50000"/>
+                  </a:schemeClr>
+                </a:solidFill>
+                <a:prstDash val="solid"/>
+                <a:miter lim="800000"/>
+              </a14:hiddenLine>
+            </a:ext>
+          </a:extLst>
+        </p:spPr>
+        <p:style>
+          <a:lnRef idx="2">
+            <a:schemeClr val="accent1">
+              <a:shade val="50000"/>
+            </a:schemeClr>
+          </a:lnRef>
+          <a:fillRef idx="1">
+            <a:schemeClr val="accent1"/>
+          </a:fillRef>
+          <a:effectRef idx="0">
+            <a:schemeClr val="accent1"/>
+          </a:effectRef>
+          <a:fontRef idx="minor">
+            <a:schemeClr val="lt1"/>
+          </a:fontRef>
+        </p:style>
+        <p:txBody>
+          <a:bodyPr rtlCol="0" anchor="ctr"/>
+          <a:lstStyle/>
+          <a:p>
+            <a:pPr algn="ctr"/>
+            <a:endParaRPr lang="en-US" dirty="0"/>
+          </a:p>
+        </p:txBody>
+      </p:sp>
+      <p:sp>
+        <p:nvSpPr>
+          <p:cNvPr id="24" name="Rectangle 23">
+            <a:extLst>
+              <a:ext uri="{FF2B5EF4-FFF2-40B4-BE49-F238E27FC236}">
+                <a16:creationId xmlns:a16="http://schemas.microsoft.com/office/drawing/2014/main" id="{F68B3F68-107C-434F-AA38-110D5EA91B85}"/>
+              </a:ext>
+              <a:ext uri="{C183D7F6-B498-43B3-948B-1728B52AA6E4}">
+                <adec:decorative xmlns:adec="http://schemas.microsoft.com/office/drawing/2017/decorative" val="1"/>
+              </a:ext>
+            </a:extLst>
+          </p:cNvPr>
+          <p:cNvSpPr>
+            <a:spLocks noGrp="1" noRot="1" noChangeAspect="1" noMove="1" noResize="1" noEditPoints="1" noAdjustHandles="1" noChangeArrowheads="1" noChangeShapeType="1" noTextEdit="1"/>
+          </p:cNvSpPr>
+          <p:nvPr>
+            <p:extLst>
+              <p:ext uri="{386F3935-93C4-4BCD-93E2-E3B085C9AB24}">
+                <p16:designElem xmlns:p16="http://schemas.microsoft.com/office/powerpoint/2015/main" val="1"/>
+              </p:ext>
+            </p:extLst>
+          </p:nvPr>
+        </p:nvSpPr>
+        <p:spPr>
+          <a:xfrm flipH="1">
+            <a:off x="2" y="0"/>
+            <a:ext cx="12191998" cy="1575955"/>
+          </a:xfrm>
+          <a:prstGeom prst="rect">
+            <a:avLst/>
+          </a:prstGeom>
+          <a:gradFill>
+            <a:gsLst>
+              <a:gs pos="0">
+                <a:srgbClr val="000000">
+                  <a:alpha val="96000"/>
+                </a:srgbClr>
+              </a:gs>
+              <a:gs pos="100000">
+                <a:schemeClr val="accent1">
+                  <a:lumMod val="75000"/>
+                </a:schemeClr>
+              </a:gs>
+            </a:gsLst>
+            <a:lin ang="8400000" scaled="0"/>
+          </a:gradFill>
+          <a:ln>
+            <a:noFill/>
+          </a:ln>
+        </p:spPr>
+        <p:style>
+          <a:lnRef idx="2">
+            <a:schemeClr val="accent1">
+              <a:shade val="50000"/>
+            </a:schemeClr>
+          </a:lnRef>
+          <a:fillRef idx="1">
+            <a:schemeClr val="accent1"/>
+          </a:fillRef>
+          <a:effectRef idx="0">
+            <a:schemeClr val="accent1"/>
+          </a:effectRef>
+          <a:fontRef idx="minor">
+            <a:schemeClr val="lt1"/>
+          </a:fontRef>
+        </p:style>
+        <p:txBody>
+          <a:bodyPr rtlCol="0" anchor="ctr"/>
+          <a:lstStyle/>
+          <a:p>
+            <a:pPr algn="ctr"/>
+            <a:endParaRPr lang="en-US" dirty="0"/>
+          </a:p>
+        </p:txBody>
+      </p:sp>
+      <p:sp>
+        <p:nvSpPr>
+          <p:cNvPr id="26" name="Rectangle 25">
+            <a:extLst>
+              <a:ext uri="{FF2B5EF4-FFF2-40B4-BE49-F238E27FC236}">
+                <a16:creationId xmlns:a16="http://schemas.microsoft.com/office/drawing/2014/main" id="{AAD0DBB9-1A4B-4391-81D4-CB19F9AB918A}"/>
+              </a:ext>
+              <a:ext uri="{C183D7F6-B498-43B3-948B-1728B52AA6E4}">
+                <adec:decorative xmlns:adec="http://schemas.microsoft.com/office/drawing/2017/decorative" val="1"/>
+              </a:ext>
+            </a:extLst>
+          </p:cNvPr>
+          <p:cNvSpPr>
+            <a:spLocks noGrp="1" noRot="1" noChangeAspect="1" noMove="1" noResize="1" noEditPoints="1" noAdjustHandles="1" noChangeArrowheads="1" noChangeShapeType="1" noTextEdit="1"/>
+          </p:cNvSpPr>
+          <p:nvPr>
+            <p:extLst>
+              <p:ext uri="{386F3935-93C4-4BCD-93E2-E3B085C9AB24}">
+                <p16:designElem xmlns:p16="http://schemas.microsoft.com/office/powerpoint/2015/main" val="1"/>
+              </p:ext>
+            </p:extLst>
+          </p:nvPr>
+        </p:nvSpPr>
+        <p:spPr>
+          <a:xfrm rot="10800000" flipH="1">
+            <a:off x="8128857" y="0"/>
+            <a:ext cx="4063143" cy="1576412"/>
+          </a:xfrm>
+          <a:prstGeom prst="rect">
+            <a:avLst/>
+          </a:prstGeom>
+          <a:gradFill>
+            <a:gsLst>
+              <a:gs pos="19000">
+                <a:schemeClr val="accent1">
+                  <a:lumMod val="50000"/>
+                  <a:alpha val="68000"/>
+                </a:schemeClr>
+              </a:gs>
+              <a:gs pos="100000">
+                <a:schemeClr val="accent1">
+                  <a:alpha val="79000"/>
+                </a:schemeClr>
+              </a:gs>
+            </a:gsLst>
+            <a:lin ang="19200000" scaled="0"/>
+          </a:gradFill>
+          <a:ln>
+            <a:noFill/>
+          </a:ln>
+        </p:spPr>
+        <p:style>
+          <a:lnRef idx="2">
+            <a:schemeClr val="accent1">
+              <a:shade val="50000"/>
+            </a:schemeClr>
+          </a:lnRef>
+          <a:fillRef idx="1">
+            <a:schemeClr val="accent1"/>
+          </a:fillRef>
+          <a:effectRef idx="0">
+            <a:schemeClr val="accent1"/>
+          </a:effectRef>
+          <a:fontRef idx="minor">
+            <a:schemeClr val="lt1"/>
+          </a:fontRef>
+        </p:style>
+        <p:txBody>
+          <a:bodyPr rtlCol="0" anchor="ctr"/>
+          <a:lstStyle/>
+          <a:p>
+            <a:pPr algn="ctr"/>
+            <a:endParaRPr lang="en-US" dirty="0"/>
+          </a:p>
+        </p:txBody>
+      </p:sp>
+      <p:sp>
+        <p:nvSpPr>
+          <p:cNvPr id="28" name="Rectangle 27">
+            <a:extLst>
+              <a:ext uri="{FF2B5EF4-FFF2-40B4-BE49-F238E27FC236}">
+                <a16:creationId xmlns:a16="http://schemas.microsoft.com/office/drawing/2014/main" id="{063BBA22-50EA-4C4D-BE05-F1CE4E63AA56}"/>
+              </a:ext>
+              <a:ext uri="{C183D7F6-B498-43B3-948B-1728B52AA6E4}">
+                <adec:decorative xmlns:adec="http://schemas.microsoft.com/office/drawing/2017/decorative" val="1"/>
+              </a:ext>
+            </a:extLst>
+          </p:cNvPr>
+          <p:cNvSpPr>
+            <a:spLocks noGrp="1" noRot="1" noChangeAspect="1" noMove="1" noResize="1" noEditPoints="1" noAdjustHandles="1" noChangeArrowheads="1" noChangeShapeType="1" noTextEdit="1"/>
+          </p:cNvSpPr>
+          <p:nvPr>
+            <p:extLst>
+              <p:ext uri="{386F3935-93C4-4BCD-93E2-E3B085C9AB24}">
+                <p16:designElem xmlns:p16="http://schemas.microsoft.com/office/powerpoint/2015/main" val="1"/>
+              </p:ext>
+            </p:extLst>
+          </p:nvPr>
+        </p:nvSpPr>
+        <p:spPr>
+          <a:xfrm rot="5400000">
+            <a:off x="5307777" y="-5307778"/>
+            <a:ext cx="1576446" cy="12192002"/>
+          </a:xfrm>
+          <a:prstGeom prst="rect">
+            <a:avLst/>
+          </a:prstGeom>
+          <a:gradFill>
+            <a:gsLst>
+              <a:gs pos="23000">
+                <a:schemeClr val="accent1">
+                  <a:alpha val="0"/>
+                </a:schemeClr>
+              </a:gs>
+              <a:gs pos="99000">
+                <a:srgbClr val="000000">
+                  <a:alpha val="74000"/>
+                </a:srgbClr>
+              </a:gs>
+            </a:gsLst>
+            <a:lin ang="20400000" scaled="0"/>
+          </a:gradFill>
+          <a:ln>
+            <a:noFill/>
+          </a:ln>
+        </p:spPr>
+        <p:style>
+          <a:lnRef idx="2">
+            <a:schemeClr val="accent1">
+              <a:shade val="50000"/>
+            </a:schemeClr>
+          </a:lnRef>
+          <a:fillRef idx="1">
+            <a:schemeClr val="accent1"/>
+          </a:fillRef>
+          <a:effectRef idx="0">
+            <a:schemeClr val="accent1"/>
+          </a:effectRef>
+          <a:fontRef idx="minor">
+            <a:schemeClr val="lt1"/>
+          </a:fontRef>
+        </p:style>
+        <p:txBody>
+          <a:bodyPr rtlCol="0" anchor="ctr"/>
+          <a:lstStyle/>
+          <a:p>
+            <a:pPr algn="ctr"/>
+            <a:endParaRPr lang="en-US" dirty="0"/>
+          </a:p>
+        </p:txBody>
+      </p:sp>
+      <p:sp>
+        <p:nvSpPr>
+          <p:cNvPr id="5" name="Title 1">
+            <a:extLst>
+              <a:ext uri="{FF2B5EF4-FFF2-40B4-BE49-F238E27FC236}">
+                <a16:creationId xmlns:a16="http://schemas.microsoft.com/office/drawing/2014/main" id="{44C13E76-35AB-7E89-9B0E-946520EC8AD3}"/>
+              </a:ext>
+            </a:extLst>
+          </p:cNvPr>
+          <p:cNvSpPr txBox="1">
+            <a:spLocks/>
+          </p:cNvSpPr>
+          <p:nvPr/>
+        </p:nvSpPr>
+        <p:spPr>
+          <a:xfrm>
+            <a:off x="530772" y="271142"/>
+            <a:ext cx="9895951" cy="1033669"/>
+          </a:xfrm>
+          <a:prstGeom prst="rect">
+            <a:avLst/>
+          </a:prstGeom>
+        </p:spPr>
+        <p:txBody>
+          <a:bodyPr vert="horz" lIns="91440" tIns="45720" rIns="91440" bIns="45720" rtlCol="0" anchor="ctr">
+            <a:noAutofit/>
+          </a:bodyPr>
+          <a:lstStyle>
+            <a:lvl1pPr algn="l" defTabSz="914400" rtl="0" eaLnBrk="1" latinLnBrk="0" hangingPunct="1">
+              <a:lnSpc>
+                <a:spcPct val="90000"/>
+              </a:lnSpc>
+              <a:spcBef>
+                <a:spcPct val="0"/>
+              </a:spcBef>
+              <a:buNone/>
+              <a:defRPr sz="4400" kern="1200">
+                <a:solidFill>
+                  <a:schemeClr val="tx1"/>
+                </a:solidFill>
+                <a:latin typeface="+mj-lt"/>
+                <a:ea typeface="+mj-ea"/>
+                <a:cs typeface="+mj-cs"/>
+              </a:defRPr>
+            </a:lvl1pPr>
+          </a:lstStyle>
+          <a:p>
+            <a:r>
+              <a:rPr lang="en-IN" sz="4000" dirty="0">
+                <a:solidFill>
+                  <a:srgbClr val="FFFFFF"/>
+                </a:solidFill>
+              </a:rPr>
               <a:t>Next Steps</a:t>
             </a:r>
             <a:endParaRPr lang="en-US" dirty="0"/>
@@ -5685,7 +6270,7 @@
 </p:sld>
 </file>
 
-<file path=ppt/slides/slide6.xml><?xml version="1.0" encoding="utf-8"?>
+<file path=ppt/slides/slide7.xml><?xml version="1.0" encoding="utf-8"?>
 <p:sld xmlns:a="http://schemas.openxmlformats.org/drawingml/2006/main" xmlns:r="http://schemas.openxmlformats.org/officeDocument/2006/relationships" xmlns:p="http://schemas.openxmlformats.org/presentationml/2006/main">
   <p:cSld>
     <p:bg>
@@ -6440,6 +7025,17 @@
 </file>
 
 <file path=customXml/item2.xml><?xml version="1.0" encoding="utf-8"?>
+<p:properties xmlns:p="http://schemas.microsoft.com/office/2006/metadata/properties" xmlns:xsi="http://www.w3.org/2001/XMLSchema-instance" xmlns:pc="http://schemas.microsoft.com/office/infopath/2007/PartnerControls">
+  <documentManagement>
+    <lcf76f155ced4ddcb4097134ff3c332f xmlns="eb237ec5-7b34-4048-9631-715884ccc04f">
+      <Terms xmlns="http://schemas.microsoft.com/office/infopath/2007/PartnerControls"/>
+    </lcf76f155ced4ddcb4097134ff3c332f>
+    <TaxCatchAll xmlns="737f1623-2dc2-4008-9151-7e09bcfb07a9" xsi:nil="true"/>
+  </documentManagement>
+</p:properties>
+</file>
+
+<file path=customXml/item3.xml><?xml version="1.0" encoding="utf-8"?>
 <ct:contentTypeSchema xmlns:ct="http://schemas.microsoft.com/office/2006/metadata/contentType" xmlns:ma="http://schemas.microsoft.com/office/2006/metadata/properties/metaAttributes" ct:_="" ma:_="" ma:contentTypeName="Document" ma:contentTypeID="0x0101008D6594B60447D24CA80180419EB33F39" ma:contentTypeVersion="13" ma:contentTypeDescription="Create a new document." ma:contentTypeScope="" ma:versionID="0dfdc30609cdd3bf75bbe793b253178e">
   <xsd:schema xmlns:xsd="http://www.w3.org/2001/XMLSchema" xmlns:xs="http://www.w3.org/2001/XMLSchema" xmlns:p="http://schemas.microsoft.com/office/2006/metadata/properties" xmlns:ns2="eb237ec5-7b34-4048-9631-715884ccc04f" xmlns:ns3="737f1623-2dc2-4008-9151-7e09bcfb07a9" targetNamespace="http://schemas.microsoft.com/office/2006/metadata/properties" ma:root="true" ma:fieldsID="52721e33bcc3122fa820ee3892832ea0" ns2:_="" ns3:_="">
     <xsd:import namespace="eb237ec5-7b34-4048-9631-715884ccc04f"/>
@@ -6662,17 +7258,6 @@
 </ct:contentTypeSchema>
 </file>
 
-<file path=customXml/item3.xml><?xml version="1.0" encoding="utf-8"?>
-<p:properties xmlns:p="http://schemas.microsoft.com/office/2006/metadata/properties" xmlns:xsi="http://www.w3.org/2001/XMLSchema-instance" xmlns:pc="http://schemas.microsoft.com/office/infopath/2007/PartnerControls">
-  <documentManagement>
-    <lcf76f155ced4ddcb4097134ff3c332f xmlns="eb237ec5-7b34-4048-9631-715884ccc04f">
-      <Terms xmlns="http://schemas.microsoft.com/office/infopath/2007/PartnerControls"/>
-    </lcf76f155ced4ddcb4097134ff3c332f>
-    <TaxCatchAll xmlns="737f1623-2dc2-4008-9151-7e09bcfb07a9" xsi:nil="true"/>
-  </documentManagement>
-</p:properties>
-</file>
-
 <file path=customXml/itemProps1.xml><?xml version="1.0" encoding="utf-8"?>
 <ds:datastoreItem xmlns:ds="http://schemas.openxmlformats.org/officeDocument/2006/customXml" ds:itemID="{E575B523-595B-4B0A-9268-A0184A515C33}">
   <ds:schemaRefs>
@@ -6682,6 +7267,17 @@
 </file>
 
 <file path=customXml/itemProps2.xml><?xml version="1.0" encoding="utf-8"?>
+<ds:datastoreItem xmlns:ds="http://schemas.openxmlformats.org/officeDocument/2006/customXml" ds:itemID="{8995B25A-A1F2-4DDA-B298-9E913786E416}">
+  <ds:schemaRefs>
+    <ds:schemaRef ds:uri="737f1623-2dc2-4008-9151-7e09bcfb07a9"/>
+    <ds:schemaRef ds:uri="eb237ec5-7b34-4048-9631-715884ccc04f"/>
+    <ds:schemaRef ds:uri="http://schemas.microsoft.com/office/2006/metadata/properties"/>
+    <ds:schemaRef ds:uri="http://schemas.microsoft.com/office/infopath/2007/PartnerControls"/>
+  </ds:schemaRefs>
+</ds:datastoreItem>
+</file>
+
+<file path=customXml/itemProps3.xml><?xml version="1.0" encoding="utf-8"?>
 <ds:datastoreItem xmlns:ds="http://schemas.openxmlformats.org/officeDocument/2006/customXml" ds:itemID="{10D7422A-5025-4E75-8C67-30771A318A97}">
   <ds:schemaRefs>
     <ds:schemaRef ds:uri="737f1623-2dc2-4008-9151-7e09bcfb07a9"/>
@@ -6698,15 +7294,4 @@
     <ds:schemaRef ds:uri="http://www.w3.org/2001/XMLSchema"/>
   </ds:schemaRefs>
 </ds:datastoreItem>
-</file>
-
-<file path=customXml/itemProps3.xml><?xml version="1.0" encoding="utf-8"?>
-<ds:datastoreItem xmlns:ds="http://schemas.openxmlformats.org/officeDocument/2006/customXml" ds:itemID="{8995B25A-A1F2-4DDA-B298-9E913786E416}">
-  <ds:schemaRefs>
-    <ds:schemaRef ds:uri="737f1623-2dc2-4008-9151-7e09bcfb07a9"/>
-    <ds:schemaRef ds:uri="eb237ec5-7b34-4048-9631-715884ccc04f"/>
-    <ds:schemaRef ds:uri="http://schemas.microsoft.com/office/2006/metadata/properties"/>
-    <ds:schemaRef ds:uri="http://schemas.microsoft.com/office/infopath/2007/PartnerControls"/>
-  </ds:schemaRefs>
-</ds:datastoreItem>
 </file>
</xml_diff>